<commit_message>
Monster generator almost done...
</commit_message>
<xml_diff>
--- a/6044_FramPat/D2D/W01/INFO_6044_Engine_F24_W01D01_Course_Intro.pptx
+++ b/6044_FramPat/D2D/W01/INFO_6044_Engine_F24_W01D01_Course_Intro.pptx
@@ -5,7 +5,7 @@
     <p:sldMasterId id="2147483892" r:id="rId1"/>
   </p:sldMasterIdLst>
   <p:notesMasterIdLst>
-    <p:notesMasterId r:id="rId20"/>
+    <p:notesMasterId r:id="rId22"/>
   </p:notesMasterIdLst>
   <p:sldIdLst>
     <p:sldId id="256" r:id="rId2"/>
@@ -21,11 +21,13 @@
     <p:sldId id="296" r:id="rId12"/>
     <p:sldId id="304" r:id="rId13"/>
     <p:sldId id="316" r:id="rId14"/>
-    <p:sldId id="311" r:id="rId15"/>
-    <p:sldId id="305" r:id="rId16"/>
-    <p:sldId id="312" r:id="rId17"/>
-    <p:sldId id="313" r:id="rId18"/>
-    <p:sldId id="314" r:id="rId19"/>
+    <p:sldId id="317" r:id="rId15"/>
+    <p:sldId id="311" r:id="rId16"/>
+    <p:sldId id="305" r:id="rId17"/>
+    <p:sldId id="318" r:id="rId18"/>
+    <p:sldId id="312" r:id="rId19"/>
+    <p:sldId id="313" r:id="rId20"/>
+    <p:sldId id="314" r:id="rId21"/>
   </p:sldIdLst>
   <p:sldSz cx="9144000" cy="5143500" type="screen16x9"/>
   <p:notesSz cx="6858000" cy="9144000"/>
@@ -226,7 +228,7 @@
             <a:fld id="{3D3F9196-5FBD-45F8-86BD-A3D90AC79AC7}" type="datetimeFigureOut">
               <a:rPr lang="en-CA" smtClean="0"/>
               <a:pPr/>
-              <a:t>2024-09-04</a:t>
+              <a:t>2024-09-16</a:t>
             </a:fld>
             <a:endParaRPr lang="en-CA"/>
           </a:p>
@@ -527,7 +529,7 @@
             <a:fld id="{8F6BCBE8-30B0-4476-8762-9236B142003A}" type="datetimeFigureOut">
               <a:rPr lang="en-US" smtClean="0"/>
               <a:pPr/>
-              <a:t>9/4/2024</a:t>
+              <a:t>9/16/2024</a:t>
             </a:fld>
             <a:endParaRPr lang="en-US" sz="1100" dirty="0">
               <a:solidFill>
@@ -1224,7 +1226,7 @@
             <a:fld id="{8F6BCBE8-30B0-4476-8762-9236B142003A}" type="datetimeFigureOut">
               <a:rPr lang="en-US" smtClean="0"/>
               <a:pPr/>
-              <a:t>9/4/2024</a:t>
+              <a:t>9/16/2024</a:t>
             </a:fld>
             <a:endParaRPr lang="en-US" sz="1100" dirty="0">
               <a:solidFill>
@@ -1409,7 +1411,7 @@
             <a:fld id="{8F6BCBE8-30B0-4476-8762-9236B142003A}" type="datetimeFigureOut">
               <a:rPr lang="en-US" smtClean="0"/>
               <a:pPr/>
-              <a:t>9/4/2024</a:t>
+              <a:t>9/16/2024</a:t>
             </a:fld>
             <a:endParaRPr lang="en-US" sz="1100" dirty="0">
               <a:solidFill>
@@ -1584,7 +1586,7 @@
             <a:fld id="{8F6BCBE8-30B0-4476-8762-9236B142003A}" type="datetimeFigureOut">
               <a:rPr lang="en-US" smtClean="0"/>
               <a:pPr/>
-              <a:t>9/4/2024</a:t>
+              <a:t>9/16/2024</a:t>
             </a:fld>
             <a:endParaRPr lang="en-US" sz="1100" dirty="0">
               <a:solidFill>
@@ -3042,7 +3044,7 @@
             <a:fld id="{8F6BCBE8-30B0-4476-8762-9236B142003A}" type="datetimeFigureOut">
               <a:rPr lang="en-US" smtClean="0"/>
               <a:pPr/>
-              <a:t>9/4/2024</a:t>
+              <a:t>9/16/2024</a:t>
             </a:fld>
             <a:endParaRPr lang="en-US" sz="1100" dirty="0">
               <a:solidFill>
@@ -3631,7 +3633,7 @@
             <a:fld id="{8F6BCBE8-30B0-4476-8762-9236B142003A}" type="datetimeFigureOut">
               <a:rPr lang="en-US" smtClean="0"/>
               <a:pPr/>
-              <a:t>9/4/2024</a:t>
+              <a:t>9/16/2024</a:t>
             </a:fld>
             <a:endParaRPr lang="en-US" sz="1100" dirty="0">
               <a:solidFill>
@@ -4070,7 +4072,7 @@
             <a:fld id="{8F6BCBE8-30B0-4476-8762-9236B142003A}" type="datetimeFigureOut">
               <a:rPr lang="en-US" smtClean="0"/>
               <a:pPr/>
-              <a:t>9/4/2024</a:t>
+              <a:t>9/16/2024</a:t>
             </a:fld>
             <a:endParaRPr lang="en-US" sz="1100" dirty="0">
               <a:solidFill>
@@ -4617,7 +4619,7 @@
             <a:fld id="{8F6BCBE8-30B0-4476-8762-9236B142003A}" type="datetimeFigureOut">
               <a:rPr lang="en-US" smtClean="0"/>
               <a:pPr/>
-              <a:t>9/4/2024</a:t>
+              <a:t>9/16/2024</a:t>
             </a:fld>
             <a:endParaRPr lang="en-US" sz="1100" dirty="0">
               <a:solidFill>
@@ -4718,7 +4720,7 @@
             <a:fld id="{8F6BCBE8-30B0-4476-8762-9236B142003A}" type="datetimeFigureOut">
               <a:rPr lang="en-US" smtClean="0"/>
               <a:pPr/>
-              <a:t>9/4/2024</a:t>
+              <a:t>9/16/2024</a:t>
             </a:fld>
             <a:endParaRPr lang="en-US" sz="1100" dirty="0">
               <a:solidFill>
@@ -4976,7 +4978,7 @@
             <a:fld id="{8F6BCBE8-30B0-4476-8762-9236B142003A}" type="datetimeFigureOut">
               <a:rPr lang="en-US" smtClean="0"/>
               <a:pPr/>
-              <a:t>9/4/2024</a:t>
+              <a:t>9/16/2024</a:t>
             </a:fld>
             <a:endParaRPr lang="en-US" sz="1100" dirty="0">
               <a:solidFill>
@@ -5698,7 +5700,7 @@
             <a:fld id="{8F6BCBE8-30B0-4476-8762-9236B142003A}" type="datetimeFigureOut">
               <a:rPr lang="en-US" smtClean="0"/>
               <a:pPr/>
-              <a:t>9/4/2024</a:t>
+              <a:t>9/16/2024</a:t>
             </a:fld>
             <a:endParaRPr lang="en-US" sz="1100" dirty="0">
               <a:solidFill>
@@ -6354,7 +6356,7 @@
             <a:fld id="{8F6BCBE8-30B0-4476-8762-9236B142003A}" type="datetimeFigureOut">
               <a:rPr lang="en-US" smtClean="0"/>
               <a:pPr/>
-              <a:t>9/4/2024</a:t>
+              <a:t>9/16/2024</a:t>
             </a:fld>
             <a:endParaRPr lang="en-US" sz="1100" dirty="0">
               <a:solidFill>
@@ -8584,6 +8586,83 @@
 </file>
 
 <file path=ppt/slides/slide14.xml><?xml version="1.0" encoding="utf-8"?>
+<p:sld xmlns:a="http://schemas.openxmlformats.org/drawingml/2006/main" xmlns:r="http://schemas.openxmlformats.org/officeDocument/2006/relationships" xmlns:p="http://schemas.openxmlformats.org/presentationml/2006/main">
+  <p:cSld>
+    <p:spTree>
+      <p:nvGrpSpPr>
+        <p:cNvPr id="1" name=""/>
+        <p:cNvGrpSpPr/>
+        <p:nvPr/>
+      </p:nvGrpSpPr>
+      <p:grpSpPr>
+        <a:xfrm>
+          <a:off x="0" y="0"/>
+          <a:ext cx="0" cy="0"/>
+          <a:chOff x="0" y="0"/>
+          <a:chExt cx="0" cy="0"/>
+        </a:xfrm>
+      </p:grpSpPr>
+      <p:pic>
+        <p:nvPicPr>
+          <p:cNvPr id="1026" name="Picture 2">
+            <a:extLst>
+              <a:ext uri="{FF2B5EF4-FFF2-40B4-BE49-F238E27FC236}">
+                <a16:creationId xmlns:a16="http://schemas.microsoft.com/office/drawing/2014/main" id="{DF8DAEFA-4E67-B617-2151-C23C00110CB9}"/>
+              </a:ext>
+            </a:extLst>
+          </p:cNvPr>
+          <p:cNvPicPr>
+            <a:picLocks noChangeAspect="1" noChangeArrowheads="1"/>
+          </p:cNvPicPr>
+          <p:nvPr/>
+        </p:nvPicPr>
+        <p:blipFill>
+          <a:blip r:embed="rId2">
+            <a:extLst>
+              <a:ext uri="{28A0092B-C50C-407E-A947-70E740481C1C}">
+                <a14:useLocalDpi xmlns:a14="http://schemas.microsoft.com/office/drawing/2010/main" val="0"/>
+              </a:ext>
+            </a:extLst>
+          </a:blip>
+          <a:srcRect/>
+          <a:stretch>
+            <a:fillRect/>
+          </a:stretch>
+        </p:blipFill>
+        <p:spPr bwMode="auto">
+          <a:xfrm>
+            <a:off x="1905000" y="401955"/>
+            <a:ext cx="4419600" cy="4419600"/>
+          </a:xfrm>
+          <a:prstGeom prst="rect">
+            <a:avLst/>
+          </a:prstGeom>
+          <a:noFill/>
+          <a:extLst>
+            <a:ext uri="{909E8E84-426E-40DD-AFC4-6F175D3DCCD1}">
+              <a14:hiddenFill xmlns:a14="http://schemas.microsoft.com/office/drawing/2010/main">
+                <a:solidFill>
+                  <a:srgbClr val="FFFFFF"/>
+                </a:solidFill>
+              </a14:hiddenFill>
+            </a:ext>
+          </a:extLst>
+        </p:spPr>
+      </p:pic>
+    </p:spTree>
+    <p:extLst>
+      <p:ext uri="{BB962C8B-B14F-4D97-AF65-F5344CB8AC3E}">
+        <p14:creationId xmlns:p14="http://schemas.microsoft.com/office/powerpoint/2010/main" val="3656730814"/>
+      </p:ext>
+    </p:extLst>
+  </p:cSld>
+  <p:clrMapOvr>
+    <a:masterClrMapping/>
+  </p:clrMapOvr>
+</p:sld>
+</file>
+
+<file path=ppt/slides/slide15.xml><?xml version="1.0" encoding="utf-8"?>
 <p:sld xmlns:a="http://schemas.openxmlformats.org/drawingml/2006/main" xmlns:r="http://schemas.openxmlformats.org/officeDocument/2006/relationships" xmlns:p="http://schemas.openxmlformats.org/presentationml/2006/main" show="0">
   <p:cSld>
     <p:spTree>
@@ -9046,7 +9125,7 @@
 </p:sld>
 </file>
 
-<file path=ppt/slides/slide15.xml><?xml version="1.0" encoding="utf-8"?>
+<file path=ppt/slides/slide16.xml><?xml version="1.0" encoding="utf-8"?>
 <p:sld xmlns:a="http://schemas.openxmlformats.org/drawingml/2006/main" xmlns:r="http://schemas.openxmlformats.org/officeDocument/2006/relationships" xmlns:p="http://schemas.openxmlformats.org/presentationml/2006/main">
   <p:cSld>
     <p:spTree>
@@ -9654,7 +9733,126 @@
 </p:sld>
 </file>
 
-<file path=ppt/slides/slide16.xml><?xml version="1.0" encoding="utf-8"?>
+<file path=ppt/slides/slide17.xml><?xml version="1.0" encoding="utf-8"?>
+<p:sld xmlns:a="http://schemas.openxmlformats.org/drawingml/2006/main" xmlns:r="http://schemas.openxmlformats.org/officeDocument/2006/relationships" xmlns:p="http://schemas.openxmlformats.org/presentationml/2006/main">
+  <p:cSld>
+    <p:spTree>
+      <p:nvGrpSpPr>
+        <p:cNvPr id="1" name=""/>
+        <p:cNvGrpSpPr/>
+        <p:nvPr/>
+      </p:nvGrpSpPr>
+      <p:grpSpPr>
+        <a:xfrm>
+          <a:off x="0" y="0"/>
+          <a:ext cx="0" cy="0"/>
+          <a:chOff x="0" y="0"/>
+          <a:chExt cx="0" cy="0"/>
+        </a:xfrm>
+      </p:grpSpPr>
+      <p:sp>
+        <p:nvSpPr>
+          <p:cNvPr id="2" name="Title 1">
+            <a:extLst>
+              <a:ext uri="{FF2B5EF4-FFF2-40B4-BE49-F238E27FC236}">
+                <a16:creationId xmlns:a16="http://schemas.microsoft.com/office/drawing/2014/main" id="{52701870-D192-6C9C-02B0-8F414B8CC44D}"/>
+              </a:ext>
+            </a:extLst>
+          </p:cNvPr>
+          <p:cNvSpPr>
+            <a:spLocks noGrp="1"/>
+          </p:cNvSpPr>
+          <p:nvPr>
+            <p:ph type="title"/>
+          </p:nvPr>
+        </p:nvSpPr>
+        <p:spPr/>
+        <p:txBody>
+          <a:bodyPr/>
+          <a:lstStyle/>
+          <a:p>
+            <a:r>
+              <a:rPr lang="en-CA" dirty="0"/>
+              <a:t>Let’s attack some monsters</a:t>
+            </a:r>
+          </a:p>
+        </p:txBody>
+      </p:sp>
+      <p:sp>
+        <p:nvSpPr>
+          <p:cNvPr id="3" name="Content Placeholder 2">
+            <a:extLst>
+              <a:ext uri="{FF2B5EF4-FFF2-40B4-BE49-F238E27FC236}">
+                <a16:creationId xmlns:a16="http://schemas.microsoft.com/office/drawing/2014/main" id="{33A5D2D7-5E92-C4FE-D16F-592C46784978}"/>
+              </a:ext>
+            </a:extLst>
+          </p:cNvPr>
+          <p:cNvSpPr>
+            <a:spLocks noGrp="1"/>
+          </p:cNvSpPr>
+          <p:nvPr>
+            <p:ph idx="1"/>
+          </p:nvPr>
+        </p:nvSpPr>
+        <p:spPr/>
+        <p:txBody>
+          <a:bodyPr/>
+          <a:lstStyle/>
+          <a:p>
+            <a:r>
+              <a:rPr lang="en-CA" dirty="0"/>
+              <a:t>Monsters have:</a:t>
+            </a:r>
+          </a:p>
+          <a:p>
+            <a:pPr lvl="1"/>
+            <a:r>
+              <a:rPr lang="en-CA" dirty="0"/>
+              <a:t>First name, last name</a:t>
+            </a:r>
+          </a:p>
+          <a:p>
+            <a:pPr lvl="1"/>
+            <a:r>
+              <a:rPr lang="en-CA" dirty="0"/>
+              <a:t>Health  (floating: 100 for 100%)</a:t>
+            </a:r>
+          </a:p>
+          <a:p>
+            <a:pPr lvl="1"/>
+            <a:r>
+              <a:rPr lang="en-CA" dirty="0"/>
+              <a:t>Location </a:t>
+            </a:r>
+            <a:r>
+              <a:rPr lang="en-CA" dirty="0" err="1"/>
+              <a:t>xyz</a:t>
+            </a:r>
+            <a:endParaRPr lang="en-CA" dirty="0"/>
+          </a:p>
+          <a:p>
+            <a:pPr lvl="1"/>
+            <a:r>
+              <a:rPr lang="en-CA" dirty="0"/>
+              <a:t>Weapon (crossbow, sword, or axe)</a:t>
+            </a:r>
+          </a:p>
+        </p:txBody>
+      </p:sp>
+    </p:spTree>
+    <p:extLst>
+      <p:ext uri="{BB962C8B-B14F-4D97-AF65-F5344CB8AC3E}">
+        <p14:creationId xmlns:p14="http://schemas.microsoft.com/office/powerpoint/2010/main" val="2039761852"/>
+      </p:ext>
+    </p:extLst>
+  </p:cSld>
+  <p:clrMapOvr>
+    <a:masterClrMapping/>
+  </p:clrMapOvr>
+</p:sld>
+</file>
+
+<file path=ppt/slides/slide18.xml><?xml version="1.0" encoding="utf-8"?>
 <p:sld xmlns:a="http://schemas.openxmlformats.org/drawingml/2006/main" xmlns:r="http://schemas.openxmlformats.org/officeDocument/2006/relationships" xmlns:p="http://schemas.openxmlformats.org/presentationml/2006/main" show="0">
   <p:cSld>
     <p:spTree>
@@ -10027,7 +10225,7 @@
 </p:sld>
 </file>
 
-<file path=ppt/slides/slide17.xml><?xml version="1.0" encoding="utf-8"?>
+<file path=ppt/slides/slide19.xml><?xml version="1.0" encoding="utf-8"?>
 <p:sld xmlns:a="http://schemas.openxmlformats.org/drawingml/2006/main" xmlns:r="http://schemas.openxmlformats.org/officeDocument/2006/relationships" xmlns:p="http://schemas.openxmlformats.org/presentationml/2006/main" show="0">
   <p:cSld>
     <p:spTree>
@@ -10524,137 +10722,6 @@
     <p:extLst>
       <p:ext uri="{BB962C8B-B14F-4D97-AF65-F5344CB8AC3E}">
         <p14:creationId xmlns:p14="http://schemas.microsoft.com/office/powerpoint/2010/main" val="657088736"/>
-      </p:ext>
-    </p:extLst>
-  </p:cSld>
-  <p:clrMapOvr>
-    <a:masterClrMapping/>
-  </p:clrMapOvr>
-  <p:transition/>
-</p:sld>
-</file>
-
-<file path=ppt/slides/slide18.xml><?xml version="1.0" encoding="utf-8"?>
-<p:sld xmlns:a="http://schemas.openxmlformats.org/drawingml/2006/main" xmlns:r="http://schemas.openxmlformats.org/officeDocument/2006/relationships" xmlns:p="http://schemas.openxmlformats.org/presentationml/2006/main" show="0">
-  <p:cSld>
-    <p:spTree>
-      <p:nvGrpSpPr>
-        <p:cNvPr id="1" name=""/>
-        <p:cNvGrpSpPr/>
-        <p:nvPr/>
-      </p:nvGrpSpPr>
-      <p:grpSpPr>
-        <a:xfrm>
-          <a:off x="0" y="0"/>
-          <a:ext cx="0" cy="0"/>
-          <a:chOff x="0" y="0"/>
-          <a:chExt cx="0" cy="0"/>
-        </a:xfrm>
-      </p:grpSpPr>
-      <p:sp>
-        <p:nvSpPr>
-          <p:cNvPr id="2" name="Rectangle 1">
-            <a:extLst>
-              <a:ext uri="{FF2B5EF4-FFF2-40B4-BE49-F238E27FC236}">
-                <a16:creationId xmlns:a16="http://schemas.microsoft.com/office/drawing/2014/main" id="{4D50E251-53B5-4985-837C-70354C9455F0}"/>
-              </a:ext>
-            </a:extLst>
-          </p:cNvPr>
-          <p:cNvSpPr/>
-          <p:nvPr/>
-        </p:nvSpPr>
-        <p:spPr>
-          <a:xfrm>
-            <a:off x="609600" y="590550"/>
-            <a:ext cx="1371600" cy="838200"/>
-          </a:xfrm>
-          <a:prstGeom prst="rect">
-            <a:avLst/>
-          </a:prstGeom>
-        </p:spPr>
-        <p:style>
-          <a:lnRef idx="2">
-            <a:schemeClr val="accent1">
-              <a:shade val="50000"/>
-            </a:schemeClr>
-          </a:lnRef>
-          <a:fillRef idx="1">
-            <a:schemeClr val="accent1"/>
-          </a:fillRef>
-          <a:effectRef idx="0">
-            <a:schemeClr val="accent1"/>
-          </a:effectRef>
-          <a:fontRef idx="minor">
-            <a:schemeClr val="lt1"/>
-          </a:fontRef>
-        </p:style>
-        <p:txBody>
-          <a:bodyPr rtlCol="0" anchor="ctr"/>
-          <a:lstStyle/>
-          <a:p>
-            <a:pPr algn="ctr"/>
-            <a:r>
-              <a:rPr lang="en-US" dirty="0" err="1"/>
-              <a:t>cPlayer.h</a:t>
-            </a:r>
-            <a:endParaRPr lang="en-CA" dirty="0"/>
-          </a:p>
-        </p:txBody>
-      </p:sp>
-      <p:sp>
-        <p:nvSpPr>
-          <p:cNvPr id="12" name="Rectangle 11">
-            <a:extLst>
-              <a:ext uri="{FF2B5EF4-FFF2-40B4-BE49-F238E27FC236}">
-                <a16:creationId xmlns:a16="http://schemas.microsoft.com/office/drawing/2014/main" id="{FC523059-834B-4E15-8216-E119438F7ED0}"/>
-              </a:ext>
-            </a:extLst>
-          </p:cNvPr>
-          <p:cNvSpPr/>
-          <p:nvPr/>
-        </p:nvSpPr>
-        <p:spPr>
-          <a:xfrm>
-            <a:off x="2514600" y="582386"/>
-            <a:ext cx="1371600" cy="838200"/>
-          </a:xfrm>
-          <a:prstGeom prst="rect">
-            <a:avLst/>
-          </a:prstGeom>
-        </p:spPr>
-        <p:style>
-          <a:lnRef idx="2">
-            <a:schemeClr val="accent1">
-              <a:shade val="50000"/>
-            </a:schemeClr>
-          </a:lnRef>
-          <a:fillRef idx="1">
-            <a:schemeClr val="accent1"/>
-          </a:fillRef>
-          <a:effectRef idx="0">
-            <a:schemeClr val="accent1"/>
-          </a:effectRef>
-          <a:fontRef idx="minor">
-            <a:schemeClr val="lt1"/>
-          </a:fontRef>
-        </p:style>
-        <p:txBody>
-          <a:bodyPr rtlCol="0" anchor="ctr"/>
-          <a:lstStyle/>
-          <a:p>
-            <a:pPr algn="ctr"/>
-            <a:r>
-              <a:rPr lang="en-US" dirty="0" err="1"/>
-              <a:t>cSword.h</a:t>
-            </a:r>
-            <a:endParaRPr lang="en-CA" dirty="0"/>
-          </a:p>
-        </p:txBody>
-      </p:sp>
-    </p:spTree>
-    <p:extLst>
-      <p:ext uri="{BB962C8B-B14F-4D97-AF65-F5344CB8AC3E}">
-        <p14:creationId xmlns:p14="http://schemas.microsoft.com/office/powerpoint/2010/main" val="766530670"/>
       </p:ext>
     </p:extLst>
   </p:cSld>
@@ -11185,6 +11252,137 @@
       <p:bldP spid="9" grpId="0" animBg="1"/>
     </p:bldLst>
   </p:timing>
+</p:sld>
+</file>
+
+<file path=ppt/slides/slide20.xml><?xml version="1.0" encoding="utf-8"?>
+<p:sld xmlns:a="http://schemas.openxmlformats.org/drawingml/2006/main" xmlns:r="http://schemas.openxmlformats.org/officeDocument/2006/relationships" xmlns:p="http://schemas.openxmlformats.org/presentationml/2006/main" show="0">
+  <p:cSld>
+    <p:spTree>
+      <p:nvGrpSpPr>
+        <p:cNvPr id="1" name=""/>
+        <p:cNvGrpSpPr/>
+        <p:nvPr/>
+      </p:nvGrpSpPr>
+      <p:grpSpPr>
+        <a:xfrm>
+          <a:off x="0" y="0"/>
+          <a:ext cx="0" cy="0"/>
+          <a:chOff x="0" y="0"/>
+          <a:chExt cx="0" cy="0"/>
+        </a:xfrm>
+      </p:grpSpPr>
+      <p:sp>
+        <p:nvSpPr>
+          <p:cNvPr id="2" name="Rectangle 1">
+            <a:extLst>
+              <a:ext uri="{FF2B5EF4-FFF2-40B4-BE49-F238E27FC236}">
+                <a16:creationId xmlns:a16="http://schemas.microsoft.com/office/drawing/2014/main" id="{4D50E251-53B5-4985-837C-70354C9455F0}"/>
+              </a:ext>
+            </a:extLst>
+          </p:cNvPr>
+          <p:cNvSpPr/>
+          <p:nvPr/>
+        </p:nvSpPr>
+        <p:spPr>
+          <a:xfrm>
+            <a:off x="609600" y="590550"/>
+            <a:ext cx="1371600" cy="838200"/>
+          </a:xfrm>
+          <a:prstGeom prst="rect">
+            <a:avLst/>
+          </a:prstGeom>
+        </p:spPr>
+        <p:style>
+          <a:lnRef idx="2">
+            <a:schemeClr val="accent1">
+              <a:shade val="50000"/>
+            </a:schemeClr>
+          </a:lnRef>
+          <a:fillRef idx="1">
+            <a:schemeClr val="accent1"/>
+          </a:fillRef>
+          <a:effectRef idx="0">
+            <a:schemeClr val="accent1"/>
+          </a:effectRef>
+          <a:fontRef idx="minor">
+            <a:schemeClr val="lt1"/>
+          </a:fontRef>
+        </p:style>
+        <p:txBody>
+          <a:bodyPr rtlCol="0" anchor="ctr"/>
+          <a:lstStyle/>
+          <a:p>
+            <a:pPr algn="ctr"/>
+            <a:r>
+              <a:rPr lang="en-US" dirty="0" err="1"/>
+              <a:t>cPlayer.h</a:t>
+            </a:r>
+            <a:endParaRPr lang="en-CA" dirty="0"/>
+          </a:p>
+        </p:txBody>
+      </p:sp>
+      <p:sp>
+        <p:nvSpPr>
+          <p:cNvPr id="12" name="Rectangle 11">
+            <a:extLst>
+              <a:ext uri="{FF2B5EF4-FFF2-40B4-BE49-F238E27FC236}">
+                <a16:creationId xmlns:a16="http://schemas.microsoft.com/office/drawing/2014/main" id="{FC523059-834B-4E15-8216-E119438F7ED0}"/>
+              </a:ext>
+            </a:extLst>
+          </p:cNvPr>
+          <p:cNvSpPr/>
+          <p:nvPr/>
+        </p:nvSpPr>
+        <p:spPr>
+          <a:xfrm>
+            <a:off x="2514600" y="582386"/>
+            <a:ext cx="1371600" cy="838200"/>
+          </a:xfrm>
+          <a:prstGeom prst="rect">
+            <a:avLst/>
+          </a:prstGeom>
+        </p:spPr>
+        <p:style>
+          <a:lnRef idx="2">
+            <a:schemeClr val="accent1">
+              <a:shade val="50000"/>
+            </a:schemeClr>
+          </a:lnRef>
+          <a:fillRef idx="1">
+            <a:schemeClr val="accent1"/>
+          </a:fillRef>
+          <a:effectRef idx="0">
+            <a:schemeClr val="accent1"/>
+          </a:effectRef>
+          <a:fontRef idx="minor">
+            <a:schemeClr val="lt1"/>
+          </a:fontRef>
+        </p:style>
+        <p:txBody>
+          <a:bodyPr rtlCol="0" anchor="ctr"/>
+          <a:lstStyle/>
+          <a:p>
+            <a:pPr algn="ctr"/>
+            <a:r>
+              <a:rPr lang="en-US" dirty="0" err="1"/>
+              <a:t>cSword.h</a:t>
+            </a:r>
+            <a:endParaRPr lang="en-CA" dirty="0"/>
+          </a:p>
+        </p:txBody>
+      </p:sp>
+    </p:spTree>
+    <p:extLst>
+      <p:ext uri="{BB962C8B-B14F-4D97-AF65-F5344CB8AC3E}">
+        <p14:creationId xmlns:p14="http://schemas.microsoft.com/office/powerpoint/2010/main" val="766530670"/>
+      </p:ext>
+    </p:extLst>
+  </p:cSld>
+  <p:clrMapOvr>
+    <a:masterClrMapping/>
+  </p:clrMapOvr>
+  <p:transition/>
 </p:sld>
 </file>
 

</xml_diff>